<commit_message>
update textbox as drawing in word
</commit_message>
<xml_diff>
--- a/images/grey_textbox.pptx
+++ b/images/grey_textbox.pptx
@@ -104,6 +104,11 @@
       </a:defRPr>
     </a:lvl9pPr>
   </p:defaultTextStyle>
+  <p:extLst>
+    <p:ext uri="{EFAFB233-063F-42B5-8137-9DF3F51BA10A}">
+      <p15:sldGuideLst xmlns:p15="http://schemas.microsoft.com/office/powerpoint/2012/main"/>
+    </p:ext>
+  </p:extLst>
 </p:presentation>
 </file>
 
@@ -254,7 +259,7 @@
           <a:p>
             <a:fld id="{B61A4640-EBE0-4C25-B560-351B48525149}" type="datetimeFigureOut">
               <a:rPr lang="de-DE" smtClean="0"/>
-              <a:t>16.11.2025</a:t>
+              <a:t>17.11.2025</a:t>
             </a:fld>
             <a:endParaRPr lang="de-DE"/>
           </a:p>
@@ -452,7 +457,7 @@
           <a:p>
             <a:fld id="{B61A4640-EBE0-4C25-B560-351B48525149}" type="datetimeFigureOut">
               <a:rPr lang="de-DE" smtClean="0"/>
-              <a:t>16.11.2025</a:t>
+              <a:t>17.11.2025</a:t>
             </a:fld>
             <a:endParaRPr lang="de-DE"/>
           </a:p>
@@ -660,7 +665,7 @@
           <a:p>
             <a:fld id="{B61A4640-EBE0-4C25-B560-351B48525149}" type="datetimeFigureOut">
               <a:rPr lang="de-DE" smtClean="0"/>
-              <a:t>16.11.2025</a:t>
+              <a:t>17.11.2025</a:t>
             </a:fld>
             <a:endParaRPr lang="de-DE"/>
           </a:p>
@@ -858,7 +863,7 @@
           <a:p>
             <a:fld id="{B61A4640-EBE0-4C25-B560-351B48525149}" type="datetimeFigureOut">
               <a:rPr lang="de-DE" smtClean="0"/>
-              <a:t>16.11.2025</a:t>
+              <a:t>17.11.2025</a:t>
             </a:fld>
             <a:endParaRPr lang="de-DE"/>
           </a:p>
@@ -1133,7 +1138,7 @@
           <a:p>
             <a:fld id="{B61A4640-EBE0-4C25-B560-351B48525149}" type="datetimeFigureOut">
               <a:rPr lang="de-DE" smtClean="0"/>
-              <a:t>16.11.2025</a:t>
+              <a:t>17.11.2025</a:t>
             </a:fld>
             <a:endParaRPr lang="de-DE"/>
           </a:p>
@@ -1398,7 +1403,7 @@
           <a:p>
             <a:fld id="{B61A4640-EBE0-4C25-B560-351B48525149}" type="datetimeFigureOut">
               <a:rPr lang="de-DE" smtClean="0"/>
-              <a:t>16.11.2025</a:t>
+              <a:t>17.11.2025</a:t>
             </a:fld>
             <a:endParaRPr lang="de-DE"/>
           </a:p>
@@ -1810,7 +1815,7 @@
           <a:p>
             <a:fld id="{B61A4640-EBE0-4C25-B560-351B48525149}" type="datetimeFigureOut">
               <a:rPr lang="de-DE" smtClean="0"/>
-              <a:t>16.11.2025</a:t>
+              <a:t>17.11.2025</a:t>
             </a:fld>
             <a:endParaRPr lang="de-DE"/>
           </a:p>
@@ -1951,7 +1956,7 @@
           <a:p>
             <a:fld id="{B61A4640-EBE0-4C25-B560-351B48525149}" type="datetimeFigureOut">
               <a:rPr lang="de-DE" smtClean="0"/>
-              <a:t>16.11.2025</a:t>
+              <a:t>17.11.2025</a:t>
             </a:fld>
             <a:endParaRPr lang="de-DE"/>
           </a:p>
@@ -2064,7 +2069,7 @@
           <a:p>
             <a:fld id="{B61A4640-EBE0-4C25-B560-351B48525149}" type="datetimeFigureOut">
               <a:rPr lang="de-DE" smtClean="0"/>
-              <a:t>16.11.2025</a:t>
+              <a:t>17.11.2025</a:t>
             </a:fld>
             <a:endParaRPr lang="de-DE"/>
           </a:p>
@@ -2375,7 +2380,7 @@
           <a:p>
             <a:fld id="{B61A4640-EBE0-4C25-B560-351B48525149}" type="datetimeFigureOut">
               <a:rPr lang="de-DE" smtClean="0"/>
-              <a:t>16.11.2025</a:t>
+              <a:t>17.11.2025</a:t>
             </a:fld>
             <a:endParaRPr lang="de-DE"/>
           </a:p>
@@ -2663,7 +2668,7 @@
           <a:p>
             <a:fld id="{B61A4640-EBE0-4C25-B560-351B48525149}" type="datetimeFigureOut">
               <a:rPr lang="de-DE" smtClean="0"/>
-              <a:t>16.11.2025</a:t>
+              <a:t>17.11.2025</a:t>
             </a:fld>
             <a:endParaRPr lang="de-DE"/>
           </a:p>
@@ -2904,7 +2909,7 @@
           <a:p>
             <a:fld id="{B61A4640-EBE0-4C25-B560-351B48525149}" type="datetimeFigureOut">
               <a:rPr lang="de-DE" smtClean="0"/>
-              <a:t>16.11.2025</a:t>
+              <a:t>17.11.2025</a:t>
             </a:fld>
             <a:endParaRPr lang="de-DE"/>
           </a:p>
@@ -3335,8 +3340,8 @@
         </p:nvSpPr>
         <p:spPr>
           <a:xfrm>
-            <a:off x="88490" y="1140542"/>
-            <a:ext cx="4159045" cy="1976284"/>
+            <a:off x="88491" y="1140542"/>
+            <a:ext cx="3883742" cy="1793158"/>
           </a:xfrm>
           <a:prstGeom prst="rect">
             <a:avLst/>
@@ -3364,80 +3369,80 @@
           <a:lstStyle/>
           <a:p>
             <a:r>
-              <a:rPr lang="en-US" sz="1200" dirty="0">
-                <a:latin typeface="Helvetica" panose="020B0604020202020204" pitchFamily="34" charset="0"/>
+              <a:rPr lang="en-US" sz="1000" dirty="0">
+                <a:latin typeface="Times New Roman" panose="02020603050405020304" pitchFamily="18" charset="0"/>
                 <a:ea typeface="Cambria" panose="02040503050406030204" pitchFamily="18" charset="0"/>
-                <a:cs typeface="Helvetica" panose="020B0604020202020204" pitchFamily="34" charset="0"/>
+                <a:cs typeface="Times New Roman" panose="02020603050405020304" pitchFamily="18" charset="0"/>
               </a:rPr>
               <a:t>“Describe the</a:t>
             </a:r>
           </a:p>
           <a:p>
             <a:r>
-              <a:rPr lang="en-US" sz="1200" dirty="0">
-                <a:latin typeface="Helvetica" panose="020B0604020202020204" pitchFamily="34" charset="0"/>
+              <a:rPr lang="en-US" sz="1000" dirty="0">
+                <a:latin typeface="Times New Roman" panose="02020603050405020304" pitchFamily="18" charset="0"/>
                 <a:ea typeface="Cambria" panose="02040503050406030204" pitchFamily="18" charset="0"/>
-                <a:cs typeface="Helvetica" panose="020B0604020202020204" pitchFamily="34" charset="0"/>
+                <a:cs typeface="Times New Roman" panose="02020603050405020304" pitchFamily="18" charset="0"/>
               </a:rPr>
               <a:t>image briefly and precisely using the object data provided.</a:t>
             </a:r>
           </a:p>
           <a:p>
             <a:r>
-              <a:rPr lang="en-US" sz="1200" dirty="0">
-                <a:latin typeface="Helvetica" panose="020B0604020202020204" pitchFamily="34" charset="0"/>
+              <a:rPr lang="en-US" sz="1000" dirty="0">
+                <a:latin typeface="Times New Roman" panose="02020603050405020304" pitchFamily="18" charset="0"/>
                 <a:ea typeface="Cambria" panose="02040503050406030204" pitchFamily="18" charset="0"/>
-                <a:cs typeface="Helvetica" panose="020B0604020202020204" pitchFamily="34" charset="0"/>
+                <a:cs typeface="Times New Roman" panose="02020603050405020304" pitchFamily="18" charset="0"/>
               </a:rPr>
               <a:t> </a:t>
             </a:r>
           </a:p>
           <a:p>
             <a:r>
-              <a:rPr lang="en-US" sz="1200" dirty="0">
-                <a:latin typeface="Helvetica" panose="020B0604020202020204" pitchFamily="34" charset="0"/>
+              <a:rPr lang="en-US" sz="1000" dirty="0">
+                <a:latin typeface="Times New Roman" panose="02020603050405020304" pitchFamily="18" charset="0"/>
                 <a:ea typeface="Cambria" panose="02040503050406030204" pitchFamily="18" charset="0"/>
-                <a:cs typeface="Helvetica" panose="020B0604020202020204" pitchFamily="34" charset="0"/>
+                <a:cs typeface="Times New Roman" panose="02020603050405020304" pitchFamily="18" charset="0"/>
               </a:rPr>
-              <a:t>{object_description }</a:t>
-            </a:r>
-          </a:p>
-          <a:p>
-            <a:r>
-              <a:rPr lang="en-US" sz="1200" dirty="0">
-                <a:latin typeface="Helvetica" panose="020B0604020202020204" pitchFamily="34" charset="0"/>
+              <a:t>{object_description}</a:t>
+            </a:r>
+          </a:p>
+          <a:p>
+            <a:r>
+              <a:rPr lang="en-US" sz="1000" dirty="0">
+                <a:latin typeface="Times New Roman" panose="02020603050405020304" pitchFamily="18" charset="0"/>
                 <a:ea typeface="Cambria" panose="02040503050406030204" pitchFamily="18" charset="0"/>
-                <a:cs typeface="Helvetica" panose="020B0604020202020204" pitchFamily="34" charset="0"/>
+                <a:cs typeface="Times New Roman" panose="02020603050405020304" pitchFamily="18" charset="0"/>
               </a:rPr>
               <a:t> </a:t>
             </a:r>
           </a:p>
           <a:p>
             <a:r>
-              <a:rPr lang="en-US" sz="1200" dirty="0">
-                <a:latin typeface="Helvetica" panose="020B0604020202020204" pitchFamily="34" charset="0"/>
+              <a:rPr lang="en-US" sz="1000" dirty="0">
+                <a:latin typeface="Times New Roman" panose="02020603050405020304" pitchFamily="18" charset="0"/>
                 <a:ea typeface="Cambria" panose="02040503050406030204" pitchFamily="18" charset="0"/>
-                <a:cs typeface="Helvetica" panose="020B0604020202020204" pitchFamily="34" charset="0"/>
+                <a:cs typeface="Times New Roman" panose="02020603050405020304" pitchFamily="18" charset="0"/>
               </a:rPr>
               <a:t>Please describe</a:t>
             </a:r>
           </a:p>
           <a:p>
             <a:r>
-              <a:rPr lang="en-US" sz="1200" dirty="0">
-                <a:latin typeface="Helvetica" panose="020B0604020202020204" pitchFamily="34" charset="0"/>
+              <a:rPr lang="en-US" sz="1000" dirty="0">
+                <a:latin typeface="Times New Roman" panose="02020603050405020304" pitchFamily="18" charset="0"/>
                 <a:ea typeface="Cambria" panose="02040503050406030204" pitchFamily="18" charset="0"/>
-                <a:cs typeface="Helvetica" panose="020B0604020202020204" pitchFamily="34" charset="0"/>
+                <a:cs typeface="Times New Roman" panose="02020603050405020304" pitchFamily="18" charset="0"/>
               </a:rPr>
               <a:t>what can be seen in the image, where important objects are located, and provide</a:t>
             </a:r>
           </a:p>
           <a:p>
             <a:r>
-              <a:rPr lang="en-US" sz="1200" dirty="0">
-                <a:latin typeface="Helvetica" panose="020B0604020202020204" pitchFamily="34" charset="0"/>
+              <a:rPr lang="en-US" sz="1000" dirty="0">
+                <a:latin typeface="Times New Roman" panose="02020603050405020304" pitchFamily="18" charset="0"/>
                 <a:ea typeface="Cambria" panose="02040503050406030204" pitchFamily="18" charset="0"/>
-                <a:cs typeface="Helvetica" panose="020B0604020202020204" pitchFamily="34" charset="0"/>
+                <a:cs typeface="Times New Roman" panose="02020603050405020304" pitchFamily="18" charset="0"/>
               </a:rPr>
               <a:t>information about possible obstacles.”</a:t>
             </a:r>

</xml_diff>